<commit_message>
Removed HOL slides from slide decks
</commit_message>
<xml_diff>
--- a/Big Data and Analytics/Azure HDInsight/Azure HDInsight.pptx
+++ b/Big Data and Analytics/Azure HDInsight/Azure HDInsight.pptx
@@ -6,7 +6,7 @@
     <p:sldMasterId id="2147483663" r:id="rId2"/>
   </p:sldMasterIdLst>
   <p:notesMasterIdLst>
-    <p:notesMasterId r:id="rId13"/>
+    <p:notesMasterId r:id="rId12"/>
   </p:notesMasterIdLst>
   <p:sldIdLst>
     <p:sldId id="256" r:id="rId3"/>
@@ -17,8 +17,7 @@
     <p:sldId id="322" r:id="rId8"/>
     <p:sldId id="323" r:id="rId9"/>
     <p:sldId id="324" r:id="rId10"/>
-    <p:sldId id="295" r:id="rId11"/>
-    <p:sldId id="299" r:id="rId12"/>
+    <p:sldId id="299" r:id="rId11"/>
   </p:sldIdLst>
   <p:sldSz cx="12192000" cy="6858000"/>
   <p:notesSz cx="6858000" cy="9144000"/>
@@ -207,7 +206,7 @@
           <a:p>
             <a:fld id="{49B60EF2-7028-489F-85D8-FE86CD7CF2A0}" type="datetimeFigureOut">
               <a:rPr lang="en-US" smtClean="0"/>
-              <a:t>9/26/2016</a:t>
+              <a:t>10/1/2016</a:t>
             </a:fld>
             <a:endParaRPr lang="en-US"/>
           </a:p>
@@ -806,7 +805,7 @@
           <a:p>
             <a:fld id="{0459C166-16D3-4A25-A2F8-C51E0E346B22}" type="datetimeFigureOut">
               <a:rPr lang="en-US" smtClean="0"/>
-              <a:t>9/26/2016</a:t>
+              <a:t>10/1/2016</a:t>
             </a:fld>
             <a:endParaRPr lang="en-US"/>
           </a:p>
@@ -901,7 +900,7 @@
           <a:p>
             <a:fld id="{0459C166-16D3-4A25-A2F8-C51E0E346B22}" type="datetimeFigureOut">
               <a:rPr lang="en-US" smtClean="0"/>
-              <a:t>9/26/2016</a:t>
+              <a:t>10/1/2016</a:t>
             </a:fld>
             <a:endParaRPr lang="en-US"/>
           </a:p>
@@ -1176,7 +1175,7 @@
           <a:p>
             <a:fld id="{0459C166-16D3-4A25-A2F8-C51E0E346B22}" type="datetimeFigureOut">
               <a:rPr lang="en-US" smtClean="0"/>
-              <a:t>9/26/2016</a:t>
+              <a:t>10/1/2016</a:t>
             </a:fld>
             <a:endParaRPr lang="en-US"/>
           </a:p>
@@ -1428,7 +1427,7 @@
           <a:p>
             <a:fld id="{0459C166-16D3-4A25-A2F8-C51E0E346B22}" type="datetimeFigureOut">
               <a:rPr lang="en-US" smtClean="0"/>
-              <a:t>9/26/2016</a:t>
+              <a:t>10/1/2016</a:t>
             </a:fld>
             <a:endParaRPr lang="en-US"/>
           </a:p>
@@ -1596,7 +1595,7 @@
           <a:p>
             <a:fld id="{0459C166-16D3-4A25-A2F8-C51E0E346B22}" type="datetimeFigureOut">
               <a:rPr lang="en-US" smtClean="0"/>
-              <a:t>9/26/2016</a:t>
+              <a:t>10/1/2016</a:t>
             </a:fld>
             <a:endParaRPr lang="en-US"/>
           </a:p>
@@ -1774,7 +1773,7 @@
           <a:p>
             <a:fld id="{0459C166-16D3-4A25-A2F8-C51E0E346B22}" type="datetimeFigureOut">
               <a:rPr lang="en-US" smtClean="0"/>
-              <a:t>9/26/2016</a:t>
+              <a:t>10/1/2016</a:t>
             </a:fld>
             <a:endParaRPr lang="en-US"/>
           </a:p>
@@ -3701,7 +3700,7 @@
           <a:p>
             <a:fld id="{0459C166-16D3-4A25-A2F8-C51E0E346B22}" type="datetimeFigureOut">
               <a:rPr lang="en-US" smtClean="0"/>
-              <a:t>9/26/2016</a:t>
+              <a:t>10/1/2016</a:t>
             </a:fld>
             <a:endParaRPr lang="en-US"/>
           </a:p>
@@ -9328,7 +9327,7 @@
             <a:fld id="{0459C166-16D3-4A25-A2F8-C51E0E346B22}" type="datetimeFigureOut">
               <a:rPr lang="en-US" smtClean="0"/>
               <a:pPr/>
-              <a:t>9/26/2016</a:t>
+              <a:t>10/1/2016</a:t>
             </a:fld>
             <a:endParaRPr lang="en-US"/>
           </a:p>
@@ -13390,7 +13389,7 @@
           <a:p>
             <a:fld id="{0459C166-16D3-4A25-A2F8-C51E0E346B22}" type="datetimeFigureOut">
               <a:rPr lang="en-US" smtClean="0"/>
-              <a:t>9/26/2016</a:t>
+              <a:t>10/1/2016</a:t>
             </a:fld>
             <a:endParaRPr lang="en-US"/>
           </a:p>
@@ -13754,7 +13753,7 @@
           <a:p>
             <a:fld id="{0459C166-16D3-4A25-A2F8-C51E0E346B22}" type="datetimeFigureOut">
               <a:rPr lang="en-US" smtClean="0"/>
-              <a:t>9/26/2016</a:t>
+              <a:t>10/1/2016</a:t>
             </a:fld>
             <a:endParaRPr lang="en-US"/>
           </a:p>
@@ -13871,7 +13870,7 @@
           <a:p>
             <a:fld id="{0459C166-16D3-4A25-A2F8-C51E0E346B22}" type="datetimeFigureOut">
               <a:rPr lang="en-US" smtClean="0"/>
-              <a:t>9/26/2016</a:t>
+              <a:t>10/1/2016</a:t>
             </a:fld>
             <a:endParaRPr lang="en-US"/>
           </a:p>
@@ -14082,7 +14081,7 @@
           <a:p>
             <a:fld id="{0459C166-16D3-4A25-A2F8-C51E0E346B22}" type="datetimeFigureOut">
               <a:rPr lang="en-US" smtClean="0"/>
-              <a:t>9/26/2016</a:t>
+              <a:t>10/1/2016</a:t>
             </a:fld>
             <a:endParaRPr lang="en-US"/>
           </a:p>
@@ -15442,46 +15441,6 @@
 </p:sld>
 </file>
 
-<file path=ppt/slides/slide10.xml><?xml version="1.0" encoding="utf-8"?>
-<p:sld xmlns:a="http://schemas.openxmlformats.org/drawingml/2006/main" xmlns:r="http://schemas.openxmlformats.org/officeDocument/2006/relationships" xmlns:p="http://schemas.openxmlformats.org/presentationml/2006/main">
-  <p:cSld>
-    <p:spTree>
-      <p:nvGrpSpPr>
-        <p:cNvPr id="1" name=""/>
-        <p:cNvGrpSpPr/>
-        <p:nvPr/>
-      </p:nvGrpSpPr>
-      <p:grpSpPr>
-        <a:xfrm>
-          <a:off x="0" y="0"/>
-          <a:ext cx="0" cy="0"/>
-          <a:chOff x="0" y="0"/>
-          <a:chExt cx="0" cy="0"/>
-        </a:xfrm>
-      </p:grpSpPr>
-    </p:spTree>
-    <p:extLst>
-      <p:ext uri="{BB962C8B-B14F-4D97-AF65-F5344CB8AC3E}">
-        <p14:creationId xmlns:p14="http://schemas.microsoft.com/office/powerpoint/2010/main" val="1570323710"/>
-      </p:ext>
-    </p:extLst>
-  </p:cSld>
-  <p:clrMapOvr>
-    <a:masterClrMapping/>
-  </p:clrMapOvr>
-  <p:transition>
-    <p:fade/>
-  </p:transition>
-  <p:timing>
-    <p:tnLst>
-      <p:par>
-        <p:cTn id="1" dur="indefinite" restart="never" nodeType="tmRoot"/>
-      </p:par>
-    </p:tnLst>
-  </p:timing>
-</p:sld>
-</file>
-
 <file path=ppt/slides/slide2.xml><?xml version="1.0" encoding="utf-8"?>
 <p:sld xmlns:a="http://schemas.openxmlformats.org/drawingml/2006/main" xmlns:r="http://schemas.openxmlformats.org/officeDocument/2006/relationships" xmlns:p="http://schemas.openxmlformats.org/presentationml/2006/main">
   <p:cSld>
@@ -16569,66 +16528,26 @@
           <a:chExt cx="0" cy="0"/>
         </a:xfrm>
       </p:grpSpPr>
-      <p:sp>
-        <p:nvSpPr>
-          <p:cNvPr id="4" name="Title 3"/>
-          <p:cNvSpPr>
-            <a:spLocks noGrp="1"/>
-          </p:cNvSpPr>
-          <p:nvPr>
-            <p:ph type="title"/>
-          </p:nvPr>
-        </p:nvSpPr>
-        <p:spPr/>
-        <p:txBody>
-          <a:bodyPr/>
-          <a:lstStyle/>
-          <a:p>
-            <a:r>
-              <a:rPr lang="en-US" dirty="0" smtClean="0"/>
-              <a:t>Hands-On Lab</a:t>
-            </a:r>
-            <a:endParaRPr lang="en-US" dirty="0"/>
-          </a:p>
-        </p:txBody>
-      </p:sp>
-      <p:sp>
-        <p:nvSpPr>
-          <p:cNvPr id="5" name="Text Placeholder 4"/>
-          <p:cNvSpPr>
-            <a:spLocks noGrp="1"/>
-          </p:cNvSpPr>
-          <p:nvPr>
-            <p:ph type="body" idx="1"/>
-          </p:nvPr>
-        </p:nvSpPr>
-        <p:spPr/>
-        <p:txBody>
-          <a:bodyPr/>
-          <a:lstStyle/>
-          <a:p>
-            <a:r>
-              <a:rPr lang="en-US" dirty="0"/>
-              <a:t>HDInsight Spark </a:t>
-            </a:r>
-            <a:r>
-              <a:rPr lang="en-US" dirty="0" smtClean="0"/>
-              <a:t>HOL.html</a:t>
-            </a:r>
-            <a:endParaRPr lang="en-US" dirty="0"/>
-          </a:p>
-        </p:txBody>
-      </p:sp>
     </p:spTree>
     <p:extLst>
       <p:ext uri="{BB962C8B-B14F-4D97-AF65-F5344CB8AC3E}">
-        <p14:creationId xmlns:p14="http://schemas.microsoft.com/office/powerpoint/2010/main" val="3335184859"/>
+        <p14:creationId xmlns:p14="http://schemas.microsoft.com/office/powerpoint/2010/main" val="1570323710"/>
       </p:ext>
     </p:extLst>
   </p:cSld>
   <p:clrMapOvr>
     <a:masterClrMapping/>
   </p:clrMapOvr>
+  <p:transition>
+    <p:fade/>
+  </p:transition>
+  <p:timing>
+    <p:tnLst>
+      <p:par>
+        <p:cTn id="1" dur="indefinite" restart="never" nodeType="tmRoot"/>
+      </p:par>
+    </p:tnLst>
+  </p:timing>
 </p:sld>
 </file>
 

</xml_diff>